<commit_message>
Hungarian GP qualification performances added
</commit_message>
<xml_diff>
--- a/plots/PPT for plots.pptx
+++ b/plots/PPT for plots.pptx
@@ -5042,7 +5042,7 @@
           <a:p>
             <a:pPr algn="r"/>
             <a:r>
-              <a:rPr lang="en-US" sz="6000" kern="1200">
+              <a:rPr lang="en-US" sz="6000" kern="1200" dirty="0">
                 <a:solidFill>
                   <a:srgbClr val="FFFFFF"/>
                 </a:solidFill>
@@ -5052,6 +5052,35 @@
               </a:rPr>
               <a:t>Formula-1 Data Analysis</a:t>
             </a:r>
+            <a:br>
+              <a:rPr lang="en-US" sz="6000" kern="1200" dirty="0">
+                <a:solidFill>
+                  <a:srgbClr val="FFFFFF"/>
+                </a:solidFill>
+                <a:latin typeface="+mj-lt"/>
+                <a:ea typeface="+mj-ea"/>
+                <a:cs typeface="+mj-cs"/>
+              </a:rPr>
+            </a:br>
+            <a:r>
+              <a:rPr lang="en-US" sz="2000" kern="1200" dirty="0">
+                <a:solidFill>
+                  <a:srgbClr val="FFFFFF"/>
+                </a:solidFill>
+                <a:latin typeface="+mj-lt"/>
+                <a:ea typeface="+mj-ea"/>
+                <a:cs typeface="+mj-cs"/>
+              </a:rPr>
+              <a:t>Follow for updates on X: @wizsights</a:t>
+            </a:r>
+            <a:endParaRPr lang="en-US" sz="6000" kern="1200" dirty="0">
+              <a:solidFill>
+                <a:srgbClr val="FFFFFF"/>
+              </a:solidFill>
+              <a:latin typeface="+mj-lt"/>
+              <a:ea typeface="+mj-ea"/>
+              <a:cs typeface="+mj-cs"/>
+            </a:endParaRPr>
           </a:p>
         </p:txBody>
       </p:sp>

</xml_diff>